<commit_message>
Modifications des documents de presentation
</commit_message>
<xml_diff>
--- a/Presentation Oracle Berkeley DB SMB214.pptx
+++ b/Presentation Oracle Berkeley DB SMB214.pptx
@@ -243,7 +243,7 @@
             <a:fld id="{3552B5B3-F216-4DE7-A802-1632A9865AE2}" type="datetimeFigureOut">
               <a:rPr lang="fr-FR" smtClean="0"/>
               <a:pPr/>
-              <a:t>28/01/2016</a:t>
+              <a:t>29/01/2016</a:t>
             </a:fld>
             <a:endParaRPr lang="fr-FR"/>
           </a:p>
@@ -3016,7 +3016,7 @@
             <a:fld id="{58AD8D6E-6829-4D52-969C-44AC7ED7CBC1}" type="datetime1">
               <a:rPr lang="fr-FR" smtClean="0"/>
               <a:pPr/>
-              <a:t>28/01/2016</a:t>
+              <a:t>29/01/2016</a:t>
             </a:fld>
             <a:endParaRPr lang="fr-FR"/>
           </a:p>
@@ -3188,7 +3188,7 @@
             <a:fld id="{875790F1-55E3-4C63-AEBD-3595FD455C82}" type="datetime1">
               <a:rPr lang="fr-FR" smtClean="0"/>
               <a:pPr/>
-              <a:t>28/01/2016</a:t>
+              <a:t>29/01/2016</a:t>
             </a:fld>
             <a:endParaRPr lang="fr-FR"/>
           </a:p>
@@ -3370,7 +3370,7 @@
             <a:fld id="{6DA43F66-79DB-4431-97CD-131103CA7D95}" type="datetime1">
               <a:rPr lang="fr-FR" smtClean="0"/>
               <a:pPr/>
-              <a:t>28/01/2016</a:t>
+              <a:t>29/01/2016</a:t>
             </a:fld>
             <a:endParaRPr lang="fr-FR"/>
           </a:p>
@@ -3542,7 +3542,7 @@
             <a:fld id="{E2C29F69-1ACC-4E0C-9CD9-8251E1DDB125}" type="datetime1">
               <a:rPr lang="fr-FR" smtClean="0"/>
               <a:pPr/>
-              <a:t>28/01/2016</a:t>
+              <a:t>29/01/2016</a:t>
             </a:fld>
             <a:endParaRPr lang="fr-FR"/>
           </a:p>
@@ -3790,7 +3790,7 @@
             <a:fld id="{B8D960DC-234F-4CD4-9CF4-F26E8CDB4995}" type="datetime1">
               <a:rPr lang="fr-FR" smtClean="0"/>
               <a:pPr/>
-              <a:t>28/01/2016</a:t>
+              <a:t>29/01/2016</a:t>
             </a:fld>
             <a:endParaRPr lang="fr-FR"/>
           </a:p>
@@ -4080,7 +4080,7 @@
             <a:fld id="{A23BA819-4ABA-4712-8CAF-8A2789F7ABA4}" type="datetime1">
               <a:rPr lang="fr-FR" smtClean="0"/>
               <a:pPr/>
-              <a:t>28/01/2016</a:t>
+              <a:t>29/01/2016</a:t>
             </a:fld>
             <a:endParaRPr lang="fr-FR"/>
           </a:p>
@@ -4504,7 +4504,7 @@
             <a:fld id="{493F5719-0AEC-42B9-B6FF-A933BAB6F1EA}" type="datetime1">
               <a:rPr lang="fr-FR" smtClean="0"/>
               <a:pPr/>
-              <a:t>28/01/2016</a:t>
+              <a:t>29/01/2016</a:t>
             </a:fld>
             <a:endParaRPr lang="fr-FR"/>
           </a:p>
@@ -4624,7 +4624,7 @@
             <a:fld id="{C148CFA5-81FD-4C3D-BF0B-EAF7E3EEB454}" type="datetime1">
               <a:rPr lang="fr-FR" smtClean="0"/>
               <a:pPr/>
-              <a:t>28/01/2016</a:t>
+              <a:t>29/01/2016</a:t>
             </a:fld>
             <a:endParaRPr lang="fr-FR"/>
           </a:p>
@@ -4721,7 +4721,7 @@
             <a:fld id="{D4F9ABE6-712F-42C3-ADF6-6466B01744A0}" type="datetime1">
               <a:rPr lang="fr-FR" smtClean="0"/>
               <a:pPr/>
-              <a:t>28/01/2016</a:t>
+              <a:t>29/01/2016</a:t>
             </a:fld>
             <a:endParaRPr lang="fr-FR"/>
           </a:p>
@@ -5000,7 +5000,7 @@
             <a:fld id="{9C2D04C7-950C-4C32-A10F-7FEBF4D84F23}" type="datetime1">
               <a:rPr lang="fr-FR" smtClean="0"/>
               <a:pPr/>
-              <a:t>28/01/2016</a:t>
+              <a:t>29/01/2016</a:t>
             </a:fld>
             <a:endParaRPr lang="fr-FR"/>
           </a:p>
@@ -5255,7 +5255,7 @@
             <a:fld id="{124B2686-4961-472F-A8F0-7005DA1D44CF}" type="datetime1">
               <a:rPr lang="fr-FR" smtClean="0"/>
               <a:pPr/>
-              <a:t>28/01/2016</a:t>
+              <a:t>29/01/2016</a:t>
             </a:fld>
             <a:endParaRPr lang="fr-FR"/>
           </a:p>
@@ -5475,7 +5475,7 @@
             <a:fld id="{0FED136F-5975-47A4-A359-BE2B7C479F12}" type="datetime1">
               <a:rPr lang="fr-FR" smtClean="0"/>
               <a:pPr/>
-              <a:t>28/01/2016</a:t>
+              <a:t>29/01/2016</a:t>
             </a:fld>
             <a:endParaRPr lang="fr-FR"/>
           </a:p>
@@ -5988,14 +5988,7 @@
                 <a:latin typeface="Times New Roman" pitchFamily="18" charset="0"/>
                 <a:cs typeface="Times New Roman" pitchFamily="18" charset="0"/>
               </a:rPr>
-              <a:t>Réalisé </a:t>
-            </a:r>
-            <a:r>
-              <a:rPr lang="fr-FR" sz="2400" b="1" dirty="0" smtClean="0">
-                <a:latin typeface="Times New Roman" pitchFamily="18" charset="0"/>
-                <a:cs typeface="Times New Roman" pitchFamily="18" charset="0"/>
-              </a:rPr>
-              <a:t>par:</a:t>
+              <a:t>Réalisé par:</a:t>
             </a:r>
           </a:p>
           <a:p>
@@ -10448,7 +10441,6 @@
               <a:rPr lang="fr-FR" dirty="0" smtClean="0"/>
               <a:t>Introduction, Qu’est ce qu'un SGBD ?</a:t>
             </a:r>
-            <a:endParaRPr lang="fr-FR" dirty="0" smtClean="0"/>
           </a:p>
           <a:p>
             <a:pPr>
@@ -10460,7 +10452,6 @@
               <a:rPr lang="fr-FR" dirty="0" smtClean="0"/>
               <a:t>Berkeley DB Histoire et actualités.</a:t>
             </a:r>
-            <a:endParaRPr lang="fr-FR" dirty="0" smtClean="0"/>
           </a:p>
           <a:p>
             <a:pPr>
@@ -10487,7 +10478,6 @@
               <a:rPr lang="fr-FR" dirty="0" smtClean="0"/>
               <a:t>Outils Berkeley DB.</a:t>
             </a:r>
-            <a:endParaRPr lang="fr-FR" dirty="0" smtClean="0"/>
           </a:p>
           <a:p>
             <a:pPr>
@@ -10497,15 +10487,7 @@
             </a:pPr>
             <a:r>
               <a:rPr lang="fr-FR" dirty="0" smtClean="0"/>
-              <a:t>Utilisation de Berkeley </a:t>
-            </a:r>
-            <a:r>
-              <a:rPr lang="fr-FR" dirty="0" smtClean="0"/>
-              <a:t>DB</a:t>
-            </a:r>
-            <a:r>
-              <a:rPr lang="fr-FR" dirty="0" smtClean="0"/>
-              <a:t>.</a:t>
+              <a:t>Utilisation de Berkeley DB.</a:t>
             </a:r>
           </a:p>
           <a:p>
@@ -10522,7 +10504,6 @@
               <a:rPr lang="fr-FR" dirty="0" smtClean="0"/>
               <a:t>.</a:t>
             </a:r>
-            <a:endParaRPr lang="fr-FR" dirty="0" smtClean="0"/>
           </a:p>
           <a:p>
             <a:pPr>
@@ -10564,7 +10545,6 @@
               <a:rPr lang="fr-FR" dirty="0" smtClean="0"/>
               <a:t> et gestion des données / Quelques propriétés de BDB.</a:t>
             </a:r>
-            <a:endParaRPr lang="fr-FR" dirty="0" smtClean="0"/>
           </a:p>
           <a:p>
             <a:pPr>
@@ -10629,13 +10609,8 @@
             </a:pPr>
             <a:r>
               <a:rPr lang="fr-FR" dirty="0" smtClean="0"/>
-              <a:t>Quel API faut il utilis</a:t>
-            </a:r>
-            <a:r>
-              <a:rPr lang="fr-FR" dirty="0" smtClean="0"/>
-              <a:t>é ?</a:t>
-            </a:r>
-            <a:endParaRPr lang="fr-FR" dirty="0" smtClean="0"/>
+              <a:t>Quel API faut il utilisé ?</a:t>
+            </a:r>
           </a:p>
           <a:p>
             <a:pPr>
@@ -10656,11 +10631,7 @@
             </a:pPr>
             <a:r>
               <a:rPr lang="fr-FR" dirty="0" smtClean="0"/>
-              <a:t>Conclusion</a:t>
-            </a:r>
-            <a:r>
-              <a:rPr lang="fr-FR" dirty="0" smtClean="0"/>
-              <a:t>.</a:t>
+              <a:t>Conclusion.</a:t>
             </a:r>
           </a:p>
         </p:txBody>
@@ -11049,11 +11020,11 @@
   <p:clrMapOvr>
     <a:masterClrMapping/>
   </p:clrMapOvr>
-  <mc:AlternateContent xmlns:mc="http://schemas.openxmlformats.org/markup-compatibility/2006">
-    <mc:Choice xmlns:p14="http://schemas.microsoft.com/office/powerpoint/2010/main" Requires="p14">
+  <mc:AlternateContent xmlns:mc="http://schemas.openxmlformats.org/markup-compatibility/2006" xmlns:p14="http://schemas.microsoft.com/office/powerpoint/2010/main">
+    <mc:Choice Requires="p14">
       <p:transition p14:dur="0"/>
     </mc:Choice>
-    <mc:Fallback>
+    <mc:Fallback xmlns="">
       <p:transition/>
     </mc:Fallback>
   </mc:AlternateContent>
@@ -12453,11 +12424,7 @@
             </a:r>
             <a:r>
               <a:rPr lang="fr-FR" dirty="0"/>
-              <a:t>de causer tout type Java </a:t>
-            </a:r>
-            <a:r>
-              <a:rPr lang="fr-FR" dirty="0"/>
-              <a:t>à</a:t>
+              <a:t>de causer tout type Java à</a:t>
             </a:r>
             <a:r>
               <a:rPr lang="fr-FR" dirty="0" smtClean="0"/>
@@ -17076,7 +17043,12 @@
             <p:ph idx="1"/>
           </p:nvPr>
         </p:nvSpPr>
-        <p:spPr/>
+        <p:spPr>
+          <a:xfrm>
+            <a:off x="457200" y="1600201"/>
+            <a:ext cx="8229600" cy="3484984"/>
+          </a:xfrm>
+        </p:spPr>
         <p:txBody>
           <a:bodyPr>
             <a:normAutofit/>
@@ -17101,36 +17073,38 @@
           <a:p>
             <a:pPr marL="0" indent="0" algn="just"/>
             <a:r>
-              <a:rPr lang="fr-FR" sz="3600" dirty="0" err="1" smtClean="0"/>
-              <a:t>Reliable</a:t>
-            </a:r>
-            <a:r>
               <a:rPr lang="fr-FR" sz="3600" dirty="0" smtClean="0"/>
-              <a:t> et </a:t>
-            </a:r>
-            <a:r>
-              <a:rPr lang="fr-FR" sz="3600" dirty="0" err="1" smtClean="0"/>
-              <a:t>scalable</a:t>
-            </a:r>
+              <a:t> Fiable et </a:t>
+            </a:r>
+            <a:r>
+              <a:rPr lang="fr-FR" sz="3600" dirty="0"/>
+              <a:t>évolutive .</a:t>
+            </a:r>
+            <a:endParaRPr lang="fr-FR" sz="3600" dirty="0" smtClean="0"/>
+          </a:p>
+          <a:p>
+            <a:pPr marL="0" indent="0" algn="just"/>
             <a:r>
               <a:rPr lang="fr-FR" sz="3600" dirty="0" smtClean="0"/>
-              <a:t>.</a:t>
-            </a:r>
-          </a:p>
-          <a:p>
-            <a:pPr marL="0" indent="0" algn="just"/>
+              <a:t> Capacité de choisir </a:t>
+            </a:r>
             <a:r>
               <a:rPr lang="fr-FR" sz="3600" dirty="0" smtClean="0"/>
-              <a:t>Abélite car on peut choisir les </a:t>
-            </a:r>
-            <a:r>
-              <a:rPr lang="fr-FR" sz="3600" dirty="0" err="1" smtClean="0"/>
-              <a:t>features</a:t>
+              <a:t>les </a:t>
             </a:r>
             <a:r>
               <a:rPr lang="fr-FR" sz="3600" dirty="0" smtClean="0"/>
-              <a:t> a utilisé. </a:t>
-            </a:r>
+              <a:t>caractéristiques et fonctions </a:t>
+            </a:r>
+            <a:r>
+              <a:rPr lang="fr-FR" sz="3600" dirty="0"/>
+              <a:t>à</a:t>
+            </a:r>
+            <a:r>
+              <a:rPr lang="fr-FR" sz="3600" dirty="0" smtClean="0"/>
+              <a:t> utiliser. </a:t>
+            </a:r>
+            <a:endParaRPr lang="fr-FR" sz="3600" dirty="0" smtClean="0"/>
           </a:p>
         </p:txBody>
       </p:sp>
@@ -17936,13 +17910,8 @@
             </a:pPr>
             <a:r>
               <a:rPr lang="fr-FR" dirty="0" smtClean="0"/>
-              <a:t>Berkeley </a:t>
-            </a:r>
-            <a:r>
-              <a:rPr lang="fr-FR" dirty="0" smtClean="0"/>
-              <a:t>DB (BDB) fait partie de la famille des bases de données « clé-valeur » et est sans doute le produit de cette famille le plus utilisé au monde avec plusieurs dizaines de millions de déploiement. </a:t>
-            </a:r>
-            <a:endParaRPr lang="fr-FR" dirty="0" smtClean="0"/>
+              <a:t>Berkeley DB (BDB) fait partie de la famille des bases de données « clé-valeur » et est sans doute le produit de cette famille le plus utilisé au monde avec plusieurs dizaines de millions de déploiement. </a:t>
+            </a:r>
           </a:p>
           <a:p>
             <a:pPr algn="just">
@@ -17950,15 +17919,7 @@
             </a:pPr>
             <a:r>
               <a:rPr lang="fr-FR" dirty="0" smtClean="0"/>
-              <a:t>La </a:t>
-            </a:r>
-            <a:r>
-              <a:rPr lang="fr-FR" dirty="0" smtClean="0"/>
-              <a:t>première version de BDB </a:t>
-            </a:r>
-            <a:r>
-              <a:rPr lang="fr-FR" dirty="0" smtClean="0"/>
-              <a:t>développé par </a:t>
+              <a:t>La première version de BDB développé par </a:t>
             </a:r>
             <a:r>
               <a:rPr lang="fr-FR" dirty="0" err="1" smtClean="0"/>
@@ -17966,23 +17927,7 @@
             </a:r>
             <a:r>
               <a:rPr lang="fr-FR" dirty="0" smtClean="0"/>
-              <a:t> software </a:t>
-            </a:r>
-            <a:r>
-              <a:rPr lang="fr-FR" dirty="0" smtClean="0"/>
-              <a:t>remonte </a:t>
-            </a:r>
-            <a:r>
-              <a:rPr lang="fr-FR" dirty="0" smtClean="0"/>
-              <a:t>à 1986 et </a:t>
-            </a:r>
-            <a:r>
-              <a:rPr lang="fr-FR" dirty="0" smtClean="0"/>
-              <a:t>est devenue </a:t>
-            </a:r>
-            <a:r>
-              <a:rPr lang="fr-FR" dirty="0" smtClean="0"/>
-              <a:t>la propriété d'Oracle depuis février 2006</a:t>
+              <a:t> software remonte à 1986 et est devenue la propriété d'Oracle depuis février 2006</a:t>
             </a:r>
             <a:r>
               <a:rPr lang="fr-FR" sz="2000" dirty="0" smtClean="0"/>
@@ -18449,11 +18394,7 @@
             </a:pPr>
             <a:r>
               <a:rPr lang="fr-FR" dirty="0" smtClean="0"/>
-              <a:t>    La dernière version de BDB c’est  </a:t>
-            </a:r>
-            <a:r>
-              <a:rPr lang="fr-FR" dirty="0" smtClean="0"/>
-              <a:t>12cR1.</a:t>
+              <a:t>    La dernière version de BDB c’est  12cR1.</a:t>
             </a:r>
           </a:p>
           <a:p>
@@ -18474,11 +18415,7 @@
             </a:r>
             <a:r>
               <a:rPr lang="fr-FR" dirty="0"/>
-              <a:t>deux licences, une libre, certifiée par l'OSI et une licence commerciale. </a:t>
-            </a:r>
-            <a:r>
-              <a:rPr lang="fr-FR" dirty="0"/>
-              <a:t>Les versions précédentes étaient sous licence BSD.</a:t>
+              <a:t>deux licences, une libre, certifiée par l'OSI et une licence commerciale. Les versions précédentes étaient sous licence BSD.</a:t>
             </a:r>
             <a:endParaRPr lang="en-US" dirty="0"/>
           </a:p>
@@ -19002,14 +18939,7 @@
                 <a:latin typeface="Times New Roman" pitchFamily="18" charset="0"/>
                 <a:cs typeface="Times New Roman" pitchFamily="18" charset="0"/>
               </a:rPr>
-              <a:t>Quantité </a:t>
-            </a:r>
-            <a:r>
-              <a:rPr lang="fr-FR" sz="2400" dirty="0" smtClean="0">
-                <a:latin typeface="Times New Roman" pitchFamily="18" charset="0"/>
-                <a:cs typeface="Times New Roman" pitchFamily="18" charset="0"/>
-              </a:rPr>
-              <a:t>immense de données(Web2.0).</a:t>
+              <a:t>Quantité immense de données(Web2.0).</a:t>
             </a:r>
           </a:p>
           <a:p>

</xml_diff>